<commit_message>
2nd day of training
</commit_message>
<xml_diff>
--- a/react_ppt.pptx
+++ b/react_ppt.pptx
@@ -5306,6 +5306,17 @@
               <a:t>JSX can reference JS variables</a:t>
             </a:r>
           </a:p>
+          <a:p>
+            <a:r>
+              <a:rPr lang="en-US" dirty="0"/>
+              <a:t>In JSX, we have to pass single React element to </a:t>
+            </a:r>
+            <a:r>
+              <a:rPr lang="en-US"/>
+              <a:t>return statement</a:t>
+            </a:r>
+            <a:endParaRPr lang="en-US" dirty="0"/>
+          </a:p>
         </p:txBody>
       </p:sp>
     </p:spTree>

</xml_diff>

<commit_message>
3rd day of training
</commit_message>
<xml_diff>
--- a/react_ppt.pptx
+++ b/react_ppt.pptx
@@ -22,7 +22,8 @@
     <p:sldId id="273" r:id="rId16"/>
     <p:sldId id="269" r:id="rId17"/>
     <p:sldId id="270" r:id="rId18"/>
-    <p:sldId id="271" r:id="rId19"/>
+    <p:sldId id="274" r:id="rId19"/>
+    <p:sldId id="271" r:id="rId20"/>
   </p:sldIdLst>
   <p:sldSz cx="12192000" cy="6858000"/>
   <p:notesSz cx="6858000" cy="9144000"/>
@@ -276,7 +277,7 @@
           <a:p>
             <a:fld id="{0BCDA30A-0689-404D-B11B-198D09A5D446}" type="datetimeFigureOut">
               <a:rPr lang="en-US" smtClean="0"/>
-              <a:t>9/12/2019</a:t>
+              <a:t>9/13/2019</a:t>
             </a:fld>
             <a:endParaRPr lang="en-US"/>
           </a:p>
@@ -474,7 +475,7 @@
           <a:p>
             <a:fld id="{0BCDA30A-0689-404D-B11B-198D09A5D446}" type="datetimeFigureOut">
               <a:rPr lang="en-US" smtClean="0"/>
-              <a:t>9/12/2019</a:t>
+              <a:t>9/13/2019</a:t>
             </a:fld>
             <a:endParaRPr lang="en-US"/>
           </a:p>
@@ -682,7 +683,7 @@
           <a:p>
             <a:fld id="{0BCDA30A-0689-404D-B11B-198D09A5D446}" type="datetimeFigureOut">
               <a:rPr lang="en-US" smtClean="0"/>
-              <a:t>9/12/2019</a:t>
+              <a:t>9/13/2019</a:t>
             </a:fld>
             <a:endParaRPr lang="en-US"/>
           </a:p>
@@ -880,7 +881,7 @@
           <a:p>
             <a:fld id="{0BCDA30A-0689-404D-B11B-198D09A5D446}" type="datetimeFigureOut">
               <a:rPr lang="en-US" smtClean="0"/>
-              <a:t>9/12/2019</a:t>
+              <a:t>9/13/2019</a:t>
             </a:fld>
             <a:endParaRPr lang="en-US"/>
           </a:p>
@@ -1155,7 +1156,7 @@
           <a:p>
             <a:fld id="{0BCDA30A-0689-404D-B11B-198D09A5D446}" type="datetimeFigureOut">
               <a:rPr lang="en-US" smtClean="0"/>
-              <a:t>9/12/2019</a:t>
+              <a:t>9/13/2019</a:t>
             </a:fld>
             <a:endParaRPr lang="en-US"/>
           </a:p>
@@ -1420,7 +1421,7 @@
           <a:p>
             <a:fld id="{0BCDA30A-0689-404D-B11B-198D09A5D446}" type="datetimeFigureOut">
               <a:rPr lang="en-US" smtClean="0"/>
-              <a:t>9/12/2019</a:t>
+              <a:t>9/13/2019</a:t>
             </a:fld>
             <a:endParaRPr lang="en-US"/>
           </a:p>
@@ -1832,7 +1833,7 @@
           <a:p>
             <a:fld id="{0BCDA30A-0689-404D-B11B-198D09A5D446}" type="datetimeFigureOut">
               <a:rPr lang="en-US" smtClean="0"/>
-              <a:t>9/12/2019</a:t>
+              <a:t>9/13/2019</a:t>
             </a:fld>
             <a:endParaRPr lang="en-US"/>
           </a:p>
@@ -1973,7 +1974,7 @@
           <a:p>
             <a:fld id="{0BCDA30A-0689-404D-B11B-198D09A5D446}" type="datetimeFigureOut">
               <a:rPr lang="en-US" smtClean="0"/>
-              <a:t>9/12/2019</a:t>
+              <a:t>9/13/2019</a:t>
             </a:fld>
             <a:endParaRPr lang="en-US"/>
           </a:p>
@@ -2086,7 +2087,7 @@
           <a:p>
             <a:fld id="{0BCDA30A-0689-404D-B11B-198D09A5D446}" type="datetimeFigureOut">
               <a:rPr lang="en-US" smtClean="0"/>
-              <a:t>9/12/2019</a:t>
+              <a:t>9/13/2019</a:t>
             </a:fld>
             <a:endParaRPr lang="en-US"/>
           </a:p>
@@ -2397,7 +2398,7 @@
           <a:p>
             <a:fld id="{0BCDA30A-0689-404D-B11B-198D09A5D446}" type="datetimeFigureOut">
               <a:rPr lang="en-US" smtClean="0"/>
-              <a:t>9/12/2019</a:t>
+              <a:t>9/13/2019</a:t>
             </a:fld>
             <a:endParaRPr lang="en-US"/>
           </a:p>
@@ -2685,7 +2686,7 @@
           <a:p>
             <a:fld id="{0BCDA30A-0689-404D-B11B-198D09A5D446}" type="datetimeFigureOut">
               <a:rPr lang="en-US" smtClean="0"/>
-              <a:t>9/12/2019</a:t>
+              <a:t>9/13/2019</a:t>
             </a:fld>
             <a:endParaRPr lang="en-US"/>
           </a:p>
@@ -2926,7 +2927,7 @@
           <a:p>
             <a:fld id="{0BCDA30A-0689-404D-B11B-198D09A5D446}" type="datetimeFigureOut">
               <a:rPr lang="en-US" smtClean="0"/>
-              <a:t>9/12/2019</a:t>
+              <a:t>9/13/2019</a:t>
             </a:fld>
             <a:endParaRPr lang="en-US"/>
           </a:p>
@@ -3959,12 +3960,6 @@
           <a:p>
             <a:endParaRPr lang="en-US" dirty="0"/>
           </a:p>
-          <a:p>
-            <a:endParaRPr lang="en-US" dirty="0"/>
-          </a:p>
-          <a:p>
-            <a:endParaRPr lang="en-US" dirty="0"/>
-          </a:p>
         </p:txBody>
       </p:sp>
     </p:spTree>
@@ -4070,10 +4065,7 @@
               <a:rPr lang="en-US" dirty="0" err="1"/>
               <a:t>componentWillUnmount</a:t>
             </a:r>
-            <a:r>
-              <a:rPr lang="en-US" dirty="0"/>
-              <a:t>	</a:t>
-            </a:r>
+            <a:endParaRPr lang="en-US" dirty="0"/>
           </a:p>
           <a:p>
             <a:endParaRPr lang="en-US" dirty="0"/>
@@ -4162,10 +4154,39 @@
           <a:bodyPr/>
           <a:lstStyle/>
           <a:p>
-            <a:pPr marL="0" indent="0">
-              <a:buNone/>
-            </a:pPr>
+            <a:r>
+              <a:rPr lang="en-US" dirty="0" err="1"/>
+              <a:t>onClick</a:t>
+            </a:r>
+            <a:r>
+              <a:rPr lang="en-US" dirty="0"/>
+              <a:t>, </a:t>
+            </a:r>
+            <a:r>
+              <a:rPr lang="en-US" dirty="0" err="1"/>
+              <a:t>onChange</a:t>
+            </a:r>
+            <a:r>
+              <a:rPr lang="en-US" dirty="0"/>
+              <a:t> and </a:t>
+            </a:r>
+            <a:r>
+              <a:rPr lang="en-US" dirty="0" err="1"/>
+              <a:t>onSubmit</a:t>
+            </a:r>
             <a:endParaRPr lang="en-US" dirty="0"/>
+          </a:p>
+          <a:p>
+            <a:r>
+              <a:rPr lang="en-US" dirty="0"/>
+              <a:t>Controlled vs Uncontrolled Elements</a:t>
+            </a:r>
+          </a:p>
+          <a:p>
+            <a:r>
+              <a:rPr lang="en-US" dirty="0"/>
+              <a:t>Communicating child to parent using callbacks</a:t>
+            </a:r>
           </a:p>
         </p:txBody>
       </p:sp>
@@ -4249,7 +4270,37 @@
           <a:bodyPr/>
           <a:lstStyle/>
           <a:p>
+            <a:r>
+              <a:rPr lang="en-US" dirty="0"/>
+              <a:t>Fetching Data</a:t>
+            </a:r>
+          </a:p>
+          <a:p>
+            <a:r>
+              <a:rPr lang="en-US" dirty="0" err="1"/>
+              <a:t>Axios</a:t>
+            </a:r>
             <a:endParaRPr lang="en-US" dirty="0"/>
+          </a:p>
+          <a:p>
+            <a:r>
+              <a:rPr lang="en-US" dirty="0" err="1"/>
+              <a:t>Async</a:t>
+            </a:r>
+            <a:r>
+              <a:rPr lang="en-US" dirty="0"/>
+              <a:t> await</a:t>
+            </a:r>
+          </a:p>
+          <a:p>
+            <a:r>
+              <a:rPr lang="en-US" dirty="0" err="1"/>
+              <a:t>Axios</a:t>
+            </a:r>
+            <a:r>
+              <a:rPr lang="en-US" dirty="0"/>
+              <a:t> configuration</a:t>
+            </a:r>
           </a:p>
         </p:txBody>
       </p:sp>
@@ -4267,6 +4318,137 @@
 </file>
 
 <file path=ppt/slides/slide18.xml><?xml version="1.0" encoding="utf-8"?>
+<p:sld xmlns:a="http://schemas.openxmlformats.org/drawingml/2006/main" xmlns:r="http://schemas.openxmlformats.org/officeDocument/2006/relationships" xmlns:p="http://schemas.openxmlformats.org/presentationml/2006/main">
+  <p:cSld>
+    <p:spTree>
+      <p:nvGrpSpPr>
+        <p:cNvPr id="1" name=""/>
+        <p:cNvGrpSpPr/>
+        <p:nvPr/>
+      </p:nvGrpSpPr>
+      <p:grpSpPr>
+        <a:xfrm>
+          <a:off x="0" y="0"/>
+          <a:ext cx="0" cy="0"/>
+          <a:chOff x="0" y="0"/>
+          <a:chExt cx="0" cy="0"/>
+        </a:xfrm>
+      </p:grpSpPr>
+      <p:sp>
+        <p:nvSpPr>
+          <p:cNvPr id="2" name="Title 1"/>
+          <p:cNvSpPr>
+            <a:spLocks noGrp="1"/>
+          </p:cNvSpPr>
+          <p:nvPr>
+            <p:ph type="title"/>
+          </p:nvPr>
+        </p:nvSpPr>
+        <p:spPr/>
+        <p:txBody>
+          <a:bodyPr/>
+          <a:lstStyle/>
+          <a:p>
+            <a:pPr algn="ctr"/>
+            <a:r>
+              <a:rPr lang="en-US" dirty="0"/>
+              <a:t>Useful Links</a:t>
+            </a:r>
+          </a:p>
+        </p:txBody>
+      </p:sp>
+      <p:sp>
+        <p:nvSpPr>
+          <p:cNvPr id="3" name="Content Placeholder 2"/>
+          <p:cNvSpPr>
+            <a:spLocks noGrp="1"/>
+          </p:cNvSpPr>
+          <p:nvPr>
+            <p:ph idx="1"/>
+          </p:nvPr>
+        </p:nvSpPr>
+        <p:spPr/>
+        <p:txBody>
+          <a:bodyPr/>
+          <a:lstStyle/>
+          <a:p>
+            <a:r>
+              <a:rPr lang="en-US" dirty="0">
+                <a:hlinkClick r:id="rId2"/>
+              </a:rPr>
+              <a:t>https://github.com/</a:t>
+            </a:r>
+            <a:endParaRPr lang="en-US" dirty="0">
+              <a:hlinkClick r:id="rId3"/>
+            </a:endParaRPr>
+          </a:p>
+          <a:p>
+            <a:r>
+              <a:rPr lang="en-US" dirty="0">
+                <a:hlinkClick r:id="rId3"/>
+              </a:rPr>
+              <a:t>https://unsplash.com/developers</a:t>
+            </a:r>
+            <a:endParaRPr lang="en-US" dirty="0"/>
+          </a:p>
+          <a:p>
+            <a:r>
+              <a:rPr lang="en-US" dirty="0">
+                <a:hlinkClick r:id="rId4"/>
+              </a:rPr>
+              <a:t>https://codepen.io/</a:t>
+            </a:r>
+            <a:endParaRPr lang="en-US" dirty="0"/>
+          </a:p>
+          <a:p>
+            <a:r>
+              <a:rPr lang="en-US" dirty="0">
+                <a:hlinkClick r:id="rId5"/>
+              </a:rPr>
+              <a:t>https://babeljs.io/repl</a:t>
+            </a:r>
+            <a:endParaRPr lang="en-US" dirty="0"/>
+          </a:p>
+          <a:p>
+            <a:r>
+              <a:rPr lang="en-US" dirty="0">
+                <a:hlinkClick r:id="rId6"/>
+              </a:rPr>
+              <a:t>https://semantic-ui.com/</a:t>
+            </a:r>
+            <a:endParaRPr lang="en-US" dirty="0"/>
+          </a:p>
+          <a:p>
+            <a:r>
+              <a:rPr lang="en-US" dirty="0">
+                <a:hlinkClick r:id="rId7"/>
+              </a:rPr>
+              <a:t>https://github.com/marak/Faker.js/</a:t>
+            </a:r>
+            <a:endParaRPr lang="en-US" dirty="0"/>
+          </a:p>
+          <a:p>
+            <a:pPr marL="0" indent="0">
+              <a:buNone/>
+            </a:pPr>
+            <a:endParaRPr lang="en-US" dirty="0"/>
+          </a:p>
+        </p:txBody>
+      </p:sp>
+    </p:spTree>
+    <p:extLst>
+      <p:ext uri="{BB962C8B-B14F-4D97-AF65-F5344CB8AC3E}">
+        <p14:creationId xmlns:p14="http://schemas.microsoft.com/office/powerpoint/2010/main" val="1968356822"/>
+      </p:ext>
+    </p:extLst>
+  </p:cSld>
+  <p:clrMapOvr>
+    <a:masterClrMapping/>
+  </p:clrMapOvr>
+</p:sld>
+</file>
+
+<file path=ppt/slides/slide19.xml><?xml version="1.0" encoding="utf-8"?>
 <p:sld xmlns:a="http://schemas.openxmlformats.org/drawingml/2006/main" xmlns:r="http://schemas.openxmlformats.org/officeDocument/2006/relationships" xmlns:p="http://schemas.openxmlformats.org/presentationml/2006/main">
   <p:cSld>
     <p:spTree>
@@ -5309,13 +5491,8 @@
           <a:p>
             <a:r>
               <a:rPr lang="en-US" dirty="0"/>
-              <a:t>In JSX, we have to pass single React element to </a:t>
-            </a:r>
-            <a:r>
-              <a:rPr lang="en-US"/>
-              <a:t>return statement</a:t>
-            </a:r>
-            <a:endParaRPr lang="en-US" dirty="0"/>
+              <a:t>In JSX, we have to pass single React element to return statement</a:t>
+            </a:r>
           </a:p>
         </p:txBody>
       </p:sp>

</xml_diff>